<commit_message>
Info som Rafael Silva skapade för Test Auto
</commit_message>
<xml_diff>
--- a/Cypress - Info.pptx
+++ b/Cypress - Info.pptx
@@ -4805,6 +4805,33 @@
         <p:txBody>
           <a:bodyPr/>
           <a:lstStyle/>
+          <a:p>
+            <a:pPr hangingPunct="0"/>
+            <a:r>
+              <a:rPr lang="sv-SE" sz="2400" b="1" dirty="0">
+                <a:latin typeface="Arial" pitchFamily="18"/>
+                <a:ea typeface="Microsoft YaHei" pitchFamily="2"/>
+                <a:cs typeface="Mangal" pitchFamily="2"/>
+              </a:rPr>
+              <a:t>Rafael Silva</a:t>
+            </a:r>
+          </a:p>
+          <a:p>
+            <a:pPr hangingPunct="0"/>
+            <a:r>
+              <a:rPr lang="sv-SE">
+                <a:latin typeface="Arial" pitchFamily="18"/>
+                <a:ea typeface="Microsoft YaHei" pitchFamily="2"/>
+                <a:cs typeface="Mangal" pitchFamily="2"/>
+              </a:rPr>
+              <a:t>Software Tester</a:t>
+            </a:r>
+            <a:endParaRPr lang="sv-SE" sz="2400">
+              <a:latin typeface="Arial" pitchFamily="18"/>
+              <a:ea typeface="Microsoft YaHei" pitchFamily="2"/>
+              <a:cs typeface="Mangal" pitchFamily="2"/>
+            </a:endParaRPr>
+          </a:p>
           <a:p>
             <a:endParaRPr lang="sv-SE"/>
           </a:p>

</xml_diff>